<commit_message>
updating the EDA ppt
</commit_message>
<xml_diff>
--- a/Capstone1_SDGE_Data_EDA.pptx
+++ b/Capstone1_SDGE_Data_EDA.pptx
@@ -236,7 +236,7 @@
           <a:p>
             <a:fld id="{21E79F9E-26E4-4B6D-82DF-6D41BDC836CE}" type="datetimeFigureOut">
               <a:rPr lang="en-US" smtClean="0"/>
-              <a:t>9/10/2019</a:t>
+              <a:t>9/11/2019</a:t>
             </a:fld>
             <a:endParaRPr lang="en-US"/>
           </a:p>
@@ -1324,7 +1324,7 @@
           <a:p>
             <a:fld id="{8588A4BC-561D-4725-8C08-4C9721C138EF}" type="datetimeFigureOut">
               <a:rPr lang="en-US" smtClean="0"/>
-              <a:t>9/10/2019</a:t>
+              <a:t>9/11/2019</a:t>
             </a:fld>
             <a:endParaRPr lang="en-US"/>
           </a:p>
@@ -1522,7 +1522,7 @@
           <a:p>
             <a:fld id="{8588A4BC-561D-4725-8C08-4C9721C138EF}" type="datetimeFigureOut">
               <a:rPr lang="en-US" smtClean="0"/>
-              <a:t>9/10/2019</a:t>
+              <a:t>9/11/2019</a:t>
             </a:fld>
             <a:endParaRPr lang="en-US"/>
           </a:p>
@@ -1730,7 +1730,7 @@
           <a:p>
             <a:fld id="{8588A4BC-561D-4725-8C08-4C9721C138EF}" type="datetimeFigureOut">
               <a:rPr lang="en-US" smtClean="0"/>
-              <a:t>9/10/2019</a:t>
+              <a:t>9/11/2019</a:t>
             </a:fld>
             <a:endParaRPr lang="en-US"/>
           </a:p>
@@ -1928,7 +1928,7 @@
           <a:p>
             <a:fld id="{8588A4BC-561D-4725-8C08-4C9721C138EF}" type="datetimeFigureOut">
               <a:rPr lang="en-US" smtClean="0"/>
-              <a:t>9/10/2019</a:t>
+              <a:t>9/11/2019</a:t>
             </a:fld>
             <a:endParaRPr lang="en-US"/>
           </a:p>
@@ -2203,7 +2203,7 @@
           <a:p>
             <a:fld id="{8588A4BC-561D-4725-8C08-4C9721C138EF}" type="datetimeFigureOut">
               <a:rPr lang="en-US" smtClean="0"/>
-              <a:t>9/10/2019</a:t>
+              <a:t>9/11/2019</a:t>
             </a:fld>
             <a:endParaRPr lang="en-US"/>
           </a:p>
@@ -2468,7 +2468,7 @@
           <a:p>
             <a:fld id="{8588A4BC-561D-4725-8C08-4C9721C138EF}" type="datetimeFigureOut">
               <a:rPr lang="en-US" smtClean="0"/>
-              <a:t>9/10/2019</a:t>
+              <a:t>9/11/2019</a:t>
             </a:fld>
             <a:endParaRPr lang="en-US"/>
           </a:p>
@@ -2880,7 +2880,7 @@
           <a:p>
             <a:fld id="{8588A4BC-561D-4725-8C08-4C9721C138EF}" type="datetimeFigureOut">
               <a:rPr lang="en-US" smtClean="0"/>
-              <a:t>9/10/2019</a:t>
+              <a:t>9/11/2019</a:t>
             </a:fld>
             <a:endParaRPr lang="en-US"/>
           </a:p>
@@ -3021,7 +3021,7 @@
           <a:p>
             <a:fld id="{8588A4BC-561D-4725-8C08-4C9721C138EF}" type="datetimeFigureOut">
               <a:rPr lang="en-US" smtClean="0"/>
-              <a:t>9/10/2019</a:t>
+              <a:t>9/11/2019</a:t>
             </a:fld>
             <a:endParaRPr lang="en-US"/>
           </a:p>
@@ -3134,7 +3134,7 @@
           <a:p>
             <a:fld id="{8588A4BC-561D-4725-8C08-4C9721C138EF}" type="datetimeFigureOut">
               <a:rPr lang="en-US" smtClean="0"/>
-              <a:t>9/10/2019</a:t>
+              <a:t>9/11/2019</a:t>
             </a:fld>
             <a:endParaRPr lang="en-US"/>
           </a:p>
@@ -3445,7 +3445,7 @@
           <a:p>
             <a:fld id="{8588A4BC-561D-4725-8C08-4C9721C138EF}" type="datetimeFigureOut">
               <a:rPr lang="en-US" smtClean="0"/>
-              <a:t>9/10/2019</a:t>
+              <a:t>9/11/2019</a:t>
             </a:fld>
             <a:endParaRPr lang="en-US"/>
           </a:p>
@@ -3733,7 +3733,7 @@
           <a:p>
             <a:fld id="{8588A4BC-561D-4725-8C08-4C9721C138EF}" type="datetimeFigureOut">
               <a:rPr lang="en-US" smtClean="0"/>
-              <a:t>9/10/2019</a:t>
+              <a:t>9/11/2019</a:t>
             </a:fld>
             <a:endParaRPr lang="en-US"/>
           </a:p>
@@ -3974,7 +3974,7 @@
           <a:p>
             <a:fld id="{8588A4BC-561D-4725-8C08-4C9721C138EF}" type="datetimeFigureOut">
               <a:rPr lang="en-US" smtClean="0"/>
-              <a:t>9/10/2019</a:t>
+              <a:t>9/11/2019</a:t>
             </a:fld>
             <a:endParaRPr lang="en-US"/>
           </a:p>

</xml_diff>